<commit_message>
Updated file on Computer Memory
</commit_message>
<xml_diff>
--- a/Dispense/CSharp - la memoria.pptx
+++ b/Dispense/CSharp - la memoria.pptx
@@ -5,7 +5,7 @@
     <p:sldMasterId id="2147484078" r:id="rId1"/>
   </p:sldMasterIdLst>
   <p:notesMasterIdLst>
-    <p:notesMasterId r:id="rId29"/>
+    <p:notesMasterId r:id="rId31"/>
   </p:notesMasterIdLst>
   <p:sldIdLst>
     <p:sldId id="256" r:id="rId2"/>
@@ -32,9 +32,11 @@
     <p:sldId id="276" r:id="rId23"/>
     <p:sldId id="277" r:id="rId24"/>
     <p:sldId id="280" r:id="rId25"/>
-    <p:sldId id="281" r:id="rId26"/>
-    <p:sldId id="282" r:id="rId27"/>
-    <p:sldId id="283" r:id="rId28"/>
+    <p:sldId id="284" r:id="rId26"/>
+    <p:sldId id="285" r:id="rId27"/>
+    <p:sldId id="281" r:id="rId28"/>
+    <p:sldId id="282" r:id="rId29"/>
+    <p:sldId id="283" r:id="rId30"/>
   </p:sldIdLst>
   <p:sldSz cx="9144000" cy="6858000" type="screen4x3"/>
   <p:notesSz cx="6858000" cy="9144000"/>
@@ -8876,7 +8878,6 @@
               <a:rPr lang="it-IT" sz="2400" b="1"/>
               <a:t>La memoria virtuale (1)</a:t>
             </a:r>
-            <a:endParaRPr lang="it-IT" sz="2400" b="1"/>
           </a:p>
         </p:txBody>
       </p:sp>
@@ -11608,8 +11609,8 @@
         </p:nvSpPr>
         <p:spPr>
           <a:xfrm>
-            <a:off x="590550" y="804059"/>
-            <a:ext cx="4432712" cy="461665"/>
+            <a:off x="590549" y="804059"/>
+            <a:ext cx="6320889" cy="461665"/>
           </a:xfrm>
           <a:prstGeom prst="rect">
             <a:avLst/>
@@ -11624,21 +11625,21 @@
           <a:p>
             <a:r>
               <a:rPr lang="it-IT" sz="2400" b="1"/>
-              <a:t>Paginazione della memoria (1)</a:t>
+              <a:t>La deallocazione della memoria (1)</a:t>
             </a:r>
           </a:p>
         </p:txBody>
       </p:sp>
       <p:sp>
         <p:nvSpPr>
-          <p:cNvPr id="3" name="TextBox 2"/>
+          <p:cNvPr id="12" name="TextBox 11"/>
           <p:cNvSpPr txBox="1"/>
           <p:nvPr/>
         </p:nvSpPr>
         <p:spPr>
           <a:xfrm>
             <a:off x="590550" y="1475260"/>
-            <a:ext cx="7781554" cy="4739759"/>
+            <a:ext cx="7781554" cy="2462213"/>
           </a:xfrm>
           <a:prstGeom prst="rect">
             <a:avLst/>
@@ -11653,7 +11654,7 @@
           <a:p>
             <a:r>
               <a:rPr lang="it-IT" sz="1400"/>
-              <a:t>La grandezza totale della memoria virtuale di un software NON coincide con la memoria fisica della RAM.</a:t>
+              <a:t>Esattamente come si può allocare memoria sullo Heap dinamicamente, così si può anche deallocarla.</a:t>
             </a:r>
           </a:p>
           <a:p>
@@ -11662,7 +11663,19 @@
           <a:p>
             <a:r>
               <a:rPr lang="it-IT" sz="1400"/>
-              <a:t>A livello fisico / hardware, un computer ha diverse memorie:</a:t>
+              <a:t>Dover deallocare a mano è un compito impegnativo e porta facilmente a commettere errori.</a:t>
+            </a:r>
+          </a:p>
+          <a:p>
+            <a:r>
+              <a:rPr lang="it-IT" sz="1400"/>
+              <a:t>Se dealloco l’area sbagliata, tolgo pezzi di informazioni che ancora mi servono.</a:t>
+            </a:r>
+          </a:p>
+          <a:p>
+            <a:r>
+              <a:rPr lang="it-IT" sz="1400"/>
+              <a:t>Se non dealloco tutti gli oggetti che non servono più, il software continua a crescere fino ad esaurire la memoria virtuale disponibile e va in crash.</a:t>
             </a:r>
           </a:p>
           <a:p>
@@ -11670,71 +11683,19 @@
           </a:p>
           <a:p>
             <a:r>
-              <a:rPr lang="it-IT" sz="1600" b="1"/>
-              <a:t>Cache del processore</a:t>
-            </a:r>
-          </a:p>
-          <a:p>
-            <a:r>
               <a:rPr lang="it-IT" sz="1400"/>
-              <a:t>Ogni processore ha una memoria cache molto ridotta (alcuni KB), ma estremamente veloce, per i calcoli con le variabili più immediate. Non è persistente (se spengo il computer, i dati vanno persi).</a:t>
+              <a:t>Dato che la deallocazione è un processo automatizzabile, la maggior parte dei linguaggi moderni possiedono dei meccanismi per gestirla dietro le quinte senza richiedere impegno da parte dello sviluppatore.</a:t>
             </a:r>
           </a:p>
           <a:p>
             <a:endParaRPr lang="it-IT" sz="1400"/>
-          </a:p>
-          <a:p>
-            <a:r>
-              <a:rPr lang="it-IT" sz="1600" b="1"/>
-              <a:t>RAM</a:t>
-            </a:r>
-          </a:p>
-          <a:p>
-            <a:r>
-              <a:rPr lang="it-IT" sz="1400"/>
-              <a:t>La RAM è una memoria di dimensioni “medie” (alcuni GB), veloce, anch’essa volatile. Internamente la RAM ha una o più cache di piccole dimensioni (alcuni MB), per un accesso più veloce ai dati più usati. Anche la RAM è volatile.</a:t>
-            </a:r>
-          </a:p>
-          <a:p>
-            <a:endParaRPr lang="it-IT" sz="1400"/>
-          </a:p>
-          <a:p>
-            <a:r>
-              <a:rPr lang="it-IT" sz="1600" b="1"/>
-              <a:t>Hard Disk / Solid State Disk</a:t>
-            </a:r>
-          </a:p>
-          <a:p>
-            <a:r>
-              <a:rPr lang="it-IT" sz="1400"/>
-              <a:t>Sono dei dispositivi con spazi di archiviazione molto grandi (da centinaia di GB ad alcuni TB), ma molto più lenti nelle capacità di lettura/scrittura. Però sono persistenti: una volta scritto il dato, esso rimane anche se spengo il computer o c’è una perdita di corrente.</a:t>
-            </a:r>
-          </a:p>
-          <a:p>
-            <a:r>
-              <a:rPr lang="it-IT" sz="1400"/>
-              <a:t/>
-            </a:r>
-            <a:br>
-              <a:rPr lang="it-IT" sz="1400"/>
-            </a:br>
-            <a:r>
-              <a:rPr lang="it-IT" sz="1600" b="1"/>
-              <a:t>ROM</a:t>
-            </a:r>
-          </a:p>
-          <a:p>
-            <a:r>
-              <a:rPr lang="it-IT" sz="1400"/>
-              <a:t>Dispositivo di memoria molto piccolo, non volatile, i cui dati non sono modificabili, e in cui sono contenute le istruzioni necessarie all’avvio del computer. I dati vengono inseriti in fase di costruzione.</a:t>
-            </a:r>
           </a:p>
         </p:txBody>
       </p:sp>
     </p:spTree>
     <p:extLst>
       <p:ext uri="{BB962C8B-B14F-4D97-AF65-F5344CB8AC3E}">
-        <p14:creationId xmlns:p14="http://schemas.microsoft.com/office/powerpoint/2010/main" val="739246278"/>
+        <p14:creationId xmlns:p14="http://schemas.microsoft.com/office/powerpoint/2010/main" val="170625856"/>
       </p:ext>
     </p:extLst>
   </p:cSld>
@@ -11745,6 +11706,188 @@
 </file>
 
 <file path=ppt/slides/slide26.xml><?xml version="1.0" encoding="utf-8"?>
+<p:sld xmlns:a="http://schemas.openxmlformats.org/drawingml/2006/main" xmlns:r="http://schemas.openxmlformats.org/officeDocument/2006/relationships" xmlns:p="http://schemas.openxmlformats.org/presentationml/2006/main">
+  <p:cSld>
+    <p:spTree>
+      <p:nvGrpSpPr>
+        <p:cNvPr id="1" name=""/>
+        <p:cNvGrpSpPr/>
+        <p:nvPr/>
+      </p:nvGrpSpPr>
+      <p:grpSpPr>
+        <a:xfrm>
+          <a:off x="0" y="0"/>
+          <a:ext cx="0" cy="0"/>
+          <a:chOff x="0" y="0"/>
+          <a:chExt cx="0" cy="0"/>
+        </a:xfrm>
+      </p:grpSpPr>
+      <p:sp>
+        <p:nvSpPr>
+          <p:cNvPr id="9" name="TextBox 8"/>
+          <p:cNvSpPr txBox="1"/>
+          <p:nvPr/>
+        </p:nvSpPr>
+        <p:spPr>
+          <a:xfrm>
+            <a:off x="590549" y="804059"/>
+            <a:ext cx="6320889" cy="461665"/>
+          </a:xfrm>
+          <a:prstGeom prst="rect">
+            <a:avLst/>
+          </a:prstGeom>
+          <a:noFill/>
+        </p:spPr>
+        <p:txBody>
+          <a:bodyPr wrap="square" rtlCol="0">
+            <a:spAutoFit/>
+          </a:bodyPr>
+          <a:lstStyle/>
+          <a:p>
+            <a:r>
+              <a:rPr lang="it-IT" sz="2400" b="1"/>
+              <a:t>La deallocazione della memoria (2)</a:t>
+            </a:r>
+          </a:p>
+        </p:txBody>
+      </p:sp>
+      <p:sp>
+        <p:nvSpPr>
+          <p:cNvPr id="12" name="TextBox 11"/>
+          <p:cNvSpPr txBox="1"/>
+          <p:nvPr/>
+        </p:nvSpPr>
+        <p:spPr>
+          <a:xfrm>
+            <a:off x="590550" y="1475260"/>
+            <a:ext cx="7781554" cy="4462760"/>
+          </a:xfrm>
+          <a:prstGeom prst="rect">
+            <a:avLst/>
+          </a:prstGeom>
+          <a:noFill/>
+        </p:spPr>
+        <p:txBody>
+          <a:bodyPr wrap="square" rtlCol="0">
+            <a:spAutoFit/>
+          </a:bodyPr>
+          <a:lstStyle/>
+          <a:p>
+            <a:r>
+              <a:rPr lang="it-IT" sz="1400"/>
+              <a:t>I meccanismi di base sono due:</a:t>
+            </a:r>
+          </a:p>
+          <a:p>
+            <a:endParaRPr lang="it-IT" sz="1400"/>
+          </a:p>
+          <a:p>
+            <a:r>
+              <a:rPr lang="it-IT" sz="1600" b="1"/>
+              <a:t>Automatic Reference Count</a:t>
+            </a:r>
+          </a:p>
+          <a:p>
+            <a:r>
+              <a:rPr lang="it-IT" sz="1400"/>
+              <a:t>Il sistema tiene traccia di quanti sono i riferimenti che puntano ad una certa area di memoria (cioè ad un certo oggetto sullo Heap). Quando il conto scende a zero, l’oggetto viene deallocato.</a:t>
+            </a:r>
+          </a:p>
+          <a:p>
+            <a:r>
+              <a:rPr lang="it-IT" sz="1400"/>
+              <a:t>Vantaggi:</a:t>
+            </a:r>
+          </a:p>
+          <a:p>
+            <a:pPr marL="285750" indent="-285750">
+              <a:buFont typeface="Arial" charset="0"/>
+              <a:buChar char="•"/>
+            </a:pPr>
+            <a:r>
+              <a:rPr lang="it-IT" sz="1400"/>
+              <a:t>È una tecnica predittiva, cioè so quando entra in gioco e che impatto di performance ha;</a:t>
+            </a:r>
+          </a:p>
+          <a:p>
+            <a:r>
+              <a:rPr lang="it-IT" sz="1400"/>
+              <a:t>Svantaggi:</a:t>
+            </a:r>
+          </a:p>
+          <a:p>
+            <a:pPr marL="285750" indent="-285750">
+              <a:buFont typeface="Arial" charset="0"/>
+              <a:buChar char="•"/>
+            </a:pPr>
+            <a:r>
+              <a:rPr lang="it-IT" sz="1400"/>
+              <a:t>se ho grafi di oggetti che si riferiscono l’un l’altro, il conto delle referenze non va mai a zero, quindi gli oggetti restano in memoria e posso arrivare al crash dell’applicazione.</a:t>
+            </a:r>
+          </a:p>
+          <a:p>
+            <a:endParaRPr lang="it-IT" sz="1400"/>
+          </a:p>
+          <a:p>
+            <a:r>
+              <a:rPr lang="it-IT" sz="1600" b="1"/>
+              <a:t>Garbage Collection</a:t>
+            </a:r>
+          </a:p>
+          <a:p>
+            <a:r>
+              <a:rPr lang="it-IT" sz="1400"/>
+              <a:t>Di tanto in tanto, viene traversato tutto il grafo di oggetti del software, e vengono dellocati sia gli oggetti che non sono puntati da alcun riferimento, sia quelli che formano un circolo chiuso di riferimenti.</a:t>
+            </a:r>
+          </a:p>
+          <a:p>
+            <a:r>
+              <a:rPr lang="it-IT" sz="1400"/>
+              <a:t>Vantaggi:</a:t>
+            </a:r>
+          </a:p>
+          <a:p>
+            <a:pPr marL="285750" indent="-285750">
+              <a:buFont typeface="Arial" charset="0"/>
+              <a:buChar char="•"/>
+            </a:pPr>
+            <a:r>
+              <a:rPr lang="it-IT" sz="1400"/>
+              <a:t>impedisce che oggetti appartenenti a grafi chiusi possano restare in memoria, quindi protegge meglio il software contro allocazioni eccessive di memoria;</a:t>
+            </a:r>
+          </a:p>
+          <a:p>
+            <a:r>
+              <a:rPr lang="it-IT" sz="1400"/>
+              <a:t>Svantaggi:</a:t>
+            </a:r>
+          </a:p>
+          <a:p>
+            <a:pPr marL="285750" indent="-285750">
+              <a:buFont typeface="Arial" charset="0"/>
+              <a:buChar char="•"/>
+            </a:pPr>
+            <a:r>
+              <a:rPr lang="it-IT" sz="1400"/>
+              <a:t>non è predittivo né nei tempi (entra in gioco in momenti non prevedibili), né nelle performance (non si sa a priori quanti oggetti dovranno essere allocati);</a:t>
+            </a:r>
+          </a:p>
+        </p:txBody>
+      </p:sp>
+    </p:spTree>
+    <p:extLst>
+      <p:ext uri="{BB962C8B-B14F-4D97-AF65-F5344CB8AC3E}">
+        <p14:creationId xmlns:p14="http://schemas.microsoft.com/office/powerpoint/2010/main" val="403248851"/>
+      </p:ext>
+    </p:extLst>
+  </p:cSld>
+  <p:clrMapOvr>
+    <a:masterClrMapping/>
+  </p:clrMapOvr>
+</p:sld>
+</file>
+
+<file path=ppt/slides/slide27.xml><?xml version="1.0" encoding="utf-8"?>
 <p:sld xmlns:a="http://schemas.openxmlformats.org/drawingml/2006/main" xmlns:r="http://schemas.openxmlformats.org/officeDocument/2006/relationships" xmlns:p="http://schemas.openxmlformats.org/presentationml/2006/main">
   <p:cSld>
     <p:spTree>
@@ -11785,6 +11928,167 @@
           <a:p>
             <a:r>
               <a:rPr lang="it-IT" sz="2400" b="1"/>
+              <a:t>Paginazione della memoria (1)</a:t>
+            </a:r>
+          </a:p>
+        </p:txBody>
+      </p:sp>
+      <p:sp>
+        <p:nvSpPr>
+          <p:cNvPr id="3" name="TextBox 2"/>
+          <p:cNvSpPr txBox="1"/>
+          <p:nvPr/>
+        </p:nvSpPr>
+        <p:spPr>
+          <a:xfrm>
+            <a:off x="590550" y="1475260"/>
+            <a:ext cx="7781554" cy="4739759"/>
+          </a:xfrm>
+          <a:prstGeom prst="rect">
+            <a:avLst/>
+          </a:prstGeom>
+          <a:noFill/>
+        </p:spPr>
+        <p:txBody>
+          <a:bodyPr wrap="square" rtlCol="0">
+            <a:spAutoFit/>
+          </a:bodyPr>
+          <a:lstStyle/>
+          <a:p>
+            <a:r>
+              <a:rPr lang="it-IT" sz="1400"/>
+              <a:t>La grandezza totale della memoria virtuale di un software NON coincide con la memoria fisica della RAM.</a:t>
+            </a:r>
+          </a:p>
+          <a:p>
+            <a:endParaRPr lang="it-IT" sz="1400"/>
+          </a:p>
+          <a:p>
+            <a:r>
+              <a:rPr lang="it-IT" sz="1400"/>
+              <a:t>A livello fisico / hardware, un computer ha diverse memorie:</a:t>
+            </a:r>
+          </a:p>
+          <a:p>
+            <a:endParaRPr lang="it-IT" sz="1400"/>
+          </a:p>
+          <a:p>
+            <a:r>
+              <a:rPr lang="it-IT" sz="1600" b="1"/>
+              <a:t>Cache del processore</a:t>
+            </a:r>
+          </a:p>
+          <a:p>
+            <a:r>
+              <a:rPr lang="it-IT" sz="1400"/>
+              <a:t>Ogni processore ha una memoria cache molto ridotta (alcuni KB), ma estremamente veloce, per i calcoli con le variabili più immediate. Non è persistente (se spengo il computer, i dati vanno persi).</a:t>
+            </a:r>
+          </a:p>
+          <a:p>
+            <a:endParaRPr lang="it-IT" sz="1400"/>
+          </a:p>
+          <a:p>
+            <a:r>
+              <a:rPr lang="it-IT" sz="1600" b="1"/>
+              <a:t>RAM</a:t>
+            </a:r>
+          </a:p>
+          <a:p>
+            <a:r>
+              <a:rPr lang="it-IT" sz="1400"/>
+              <a:t>La RAM è una memoria di dimensioni “medie” (alcuni GB), veloce, anch’essa volatile. Internamente la RAM ha una o più cache di piccole dimensioni (alcuni MB), per un accesso più veloce ai dati più usati. Anche la RAM è volatile.</a:t>
+            </a:r>
+          </a:p>
+          <a:p>
+            <a:endParaRPr lang="it-IT" sz="1400"/>
+          </a:p>
+          <a:p>
+            <a:r>
+              <a:rPr lang="it-IT" sz="1600" b="1"/>
+              <a:t>Hard Disk / Solid State Disk</a:t>
+            </a:r>
+          </a:p>
+          <a:p>
+            <a:r>
+              <a:rPr lang="it-IT" sz="1400"/>
+              <a:t>Sono dei dispositivi con spazi di archiviazione molto grandi (da centinaia di GB ad alcuni TB), ma molto più lenti nelle capacità di lettura/scrittura. Però sono persistenti: una volta scritto il dato, esso rimane anche se spengo il computer o c’è una perdita di corrente.</a:t>
+            </a:r>
+          </a:p>
+          <a:p>
+            <a:r>
+              <a:rPr lang="it-IT" sz="1400"/>
+              <a:t/>
+            </a:r>
+            <a:br>
+              <a:rPr lang="it-IT" sz="1400"/>
+            </a:br>
+            <a:r>
+              <a:rPr lang="it-IT" sz="1600" b="1"/>
+              <a:t>ROM</a:t>
+            </a:r>
+          </a:p>
+          <a:p>
+            <a:r>
+              <a:rPr lang="it-IT" sz="1400"/>
+              <a:t>Dispositivo di memoria molto piccolo, non volatile, i cui dati non sono modificabili, e in cui sono contenute le istruzioni necessarie all’avvio del computer. I dati vengono inseriti in fase di costruzione.</a:t>
+            </a:r>
+          </a:p>
+        </p:txBody>
+      </p:sp>
+    </p:spTree>
+    <p:extLst>
+      <p:ext uri="{BB962C8B-B14F-4D97-AF65-F5344CB8AC3E}">
+        <p14:creationId xmlns:p14="http://schemas.microsoft.com/office/powerpoint/2010/main" val="739246278"/>
+      </p:ext>
+    </p:extLst>
+  </p:cSld>
+  <p:clrMapOvr>
+    <a:masterClrMapping/>
+  </p:clrMapOvr>
+</p:sld>
+</file>
+
+<file path=ppt/slides/slide28.xml><?xml version="1.0" encoding="utf-8"?>
+<p:sld xmlns:a="http://schemas.openxmlformats.org/drawingml/2006/main" xmlns:r="http://schemas.openxmlformats.org/officeDocument/2006/relationships" xmlns:p="http://schemas.openxmlformats.org/presentationml/2006/main">
+  <p:cSld>
+    <p:spTree>
+      <p:nvGrpSpPr>
+        <p:cNvPr id="1" name=""/>
+        <p:cNvGrpSpPr/>
+        <p:nvPr/>
+      </p:nvGrpSpPr>
+      <p:grpSpPr>
+        <a:xfrm>
+          <a:off x="0" y="0"/>
+          <a:ext cx="0" cy="0"/>
+          <a:chOff x="0" y="0"/>
+          <a:chExt cx="0" cy="0"/>
+        </a:xfrm>
+      </p:grpSpPr>
+      <p:sp>
+        <p:nvSpPr>
+          <p:cNvPr id="9" name="TextBox 8"/>
+          <p:cNvSpPr txBox="1"/>
+          <p:nvPr/>
+        </p:nvSpPr>
+        <p:spPr>
+          <a:xfrm>
+            <a:off x="590550" y="804059"/>
+            <a:ext cx="4432712" cy="461665"/>
+          </a:xfrm>
+          <a:prstGeom prst="rect">
+            <a:avLst/>
+          </a:prstGeom>
+          <a:noFill/>
+        </p:spPr>
+        <p:txBody>
+          <a:bodyPr wrap="square" rtlCol="0">
+            <a:spAutoFit/>
+          </a:bodyPr>
+          <a:lstStyle/>
+          <a:p>
+            <a:r>
+              <a:rPr lang="it-IT" sz="2400" b="1"/>
               <a:t>Paginazione della memoria (2)</a:t>
             </a:r>
           </a:p>
@@ -11817,7 +12121,6 @@
               <a:rPr lang="it-IT" sz="1400"/>
               <a:t>La grandezza totale della memoria virtuale di un software NON coincide con la memoria fisica della RAM.</a:t>
             </a:r>
-            <a:endParaRPr lang="it-IT" sz="1400"/>
           </a:p>
           <a:p>
             <a:pPr algn="just"/>
@@ -11874,7 +12177,7 @@
 </p:sld>
 </file>
 
-<file path=ppt/slides/slide27.xml><?xml version="1.0" encoding="utf-8"?>
+<file path=ppt/slides/slide29.xml><?xml version="1.0" encoding="utf-8"?>
 <p:sld xmlns:a="http://schemas.openxmlformats.org/drawingml/2006/main" xmlns:r="http://schemas.openxmlformats.org/officeDocument/2006/relationships" xmlns:p="http://schemas.openxmlformats.org/presentationml/2006/main">
   <p:cSld>
     <p:spTree>
@@ -12150,7 +12453,6 @@
               <a:rPr lang="it-IT" sz="2400" b="1"/>
               <a:t>La memoria virtuale (2)</a:t>
             </a:r>
-            <a:endParaRPr lang="it-IT" sz="2400" b="1"/>
           </a:p>
         </p:txBody>
       </p:sp>

</xml_diff>